<commit_message>
added more stuff lol
</commit_message>
<xml_diff>
--- a/Presentation.pptx
+++ b/Presentation.pptx
@@ -7,9 +7,9 @@
   <p:sldIdLst>
     <p:sldId id="256" r:id="rId2"/>
     <p:sldId id="257" r:id="rId3"/>
-    <p:sldId id="258" r:id="rId4"/>
-    <p:sldId id="259" r:id="rId5"/>
-    <p:sldId id="260" r:id="rId6"/>
+    <p:sldId id="260" r:id="rId4"/>
+    <p:sldId id="261" r:id="rId5"/>
+    <p:sldId id="259" r:id="rId6"/>
   </p:sldIdLst>
   <p:sldSz cx="12192000" cy="6858000"/>
   <p:notesSz cx="6858000" cy="9144000"/>
@@ -108,6 +108,11 @@
       </a:defRPr>
     </a:lvl9pPr>
   </p:defaultTextStyle>
+  <p:extLst>
+    <p:ext uri="{EFAFB233-063F-42B5-8137-9DF3F51BA10A}">
+      <p15:sldGuideLst xmlns:p15="http://schemas.microsoft.com/office/powerpoint/2012/main"/>
+    </p:ext>
+  </p:extLst>
 </p:presentation>
 </file>
 
@@ -260,7 +265,7 @@
           <a:p>
             <a:fld id="{F5EFB16E-CBF0-4F9C-93CA-81A8488BFABD}" type="datetimeFigureOut">
               <a:rPr lang="en-GB" smtClean="0"/>
-              <a:t>13/02/2021</a:t>
+              <a:t>16/02/2021</a:t>
             </a:fld>
             <a:endParaRPr lang="en-GB"/>
           </a:p>
@@ -460,7 +465,7 @@
           <a:p>
             <a:fld id="{F5EFB16E-CBF0-4F9C-93CA-81A8488BFABD}" type="datetimeFigureOut">
               <a:rPr lang="en-GB" smtClean="0"/>
-              <a:t>13/02/2021</a:t>
+              <a:t>16/02/2021</a:t>
             </a:fld>
             <a:endParaRPr lang="en-GB"/>
           </a:p>
@@ -670,7 +675,7 @@
           <a:p>
             <a:fld id="{F5EFB16E-CBF0-4F9C-93CA-81A8488BFABD}" type="datetimeFigureOut">
               <a:rPr lang="en-GB" smtClean="0"/>
-              <a:t>13/02/2021</a:t>
+              <a:t>16/02/2021</a:t>
             </a:fld>
             <a:endParaRPr lang="en-GB"/>
           </a:p>
@@ -870,7 +875,7 @@
           <a:p>
             <a:fld id="{F5EFB16E-CBF0-4F9C-93CA-81A8488BFABD}" type="datetimeFigureOut">
               <a:rPr lang="en-GB" smtClean="0"/>
-              <a:t>13/02/2021</a:t>
+              <a:t>16/02/2021</a:t>
             </a:fld>
             <a:endParaRPr lang="en-GB"/>
           </a:p>
@@ -1146,7 +1151,7 @@
           <a:p>
             <a:fld id="{F5EFB16E-CBF0-4F9C-93CA-81A8488BFABD}" type="datetimeFigureOut">
               <a:rPr lang="en-GB" smtClean="0"/>
-              <a:t>13/02/2021</a:t>
+              <a:t>16/02/2021</a:t>
             </a:fld>
             <a:endParaRPr lang="en-GB"/>
           </a:p>
@@ -1414,7 +1419,7 @@
           <a:p>
             <a:fld id="{F5EFB16E-CBF0-4F9C-93CA-81A8488BFABD}" type="datetimeFigureOut">
               <a:rPr lang="en-GB" smtClean="0"/>
-              <a:t>13/02/2021</a:t>
+              <a:t>16/02/2021</a:t>
             </a:fld>
             <a:endParaRPr lang="en-GB"/>
           </a:p>
@@ -1829,7 +1834,7 @@
           <a:p>
             <a:fld id="{F5EFB16E-CBF0-4F9C-93CA-81A8488BFABD}" type="datetimeFigureOut">
               <a:rPr lang="en-GB" smtClean="0"/>
-              <a:t>13/02/2021</a:t>
+              <a:t>16/02/2021</a:t>
             </a:fld>
             <a:endParaRPr lang="en-GB"/>
           </a:p>
@@ -1971,7 +1976,7 @@
           <a:p>
             <a:fld id="{F5EFB16E-CBF0-4F9C-93CA-81A8488BFABD}" type="datetimeFigureOut">
               <a:rPr lang="en-GB" smtClean="0"/>
-              <a:t>13/02/2021</a:t>
+              <a:t>16/02/2021</a:t>
             </a:fld>
             <a:endParaRPr lang="en-GB"/>
           </a:p>
@@ -2084,7 +2089,7 @@
           <a:p>
             <a:fld id="{F5EFB16E-CBF0-4F9C-93CA-81A8488BFABD}" type="datetimeFigureOut">
               <a:rPr lang="en-GB" smtClean="0"/>
-              <a:t>13/02/2021</a:t>
+              <a:t>16/02/2021</a:t>
             </a:fld>
             <a:endParaRPr lang="en-GB"/>
           </a:p>
@@ -2397,7 +2402,7 @@
           <a:p>
             <a:fld id="{F5EFB16E-CBF0-4F9C-93CA-81A8488BFABD}" type="datetimeFigureOut">
               <a:rPr lang="en-GB" smtClean="0"/>
-              <a:t>13/02/2021</a:t>
+              <a:t>16/02/2021</a:t>
             </a:fld>
             <a:endParaRPr lang="en-GB"/>
           </a:p>
@@ -2686,7 +2691,7 @@
           <a:p>
             <a:fld id="{F5EFB16E-CBF0-4F9C-93CA-81A8488BFABD}" type="datetimeFigureOut">
               <a:rPr lang="en-GB" smtClean="0"/>
-              <a:t>13/02/2021</a:t>
+              <a:t>16/02/2021</a:t>
             </a:fld>
             <a:endParaRPr lang="en-GB"/>
           </a:p>
@@ -2929,7 +2934,7 @@
           <a:p>
             <a:fld id="{F5EFB16E-CBF0-4F9C-93CA-81A8488BFABD}" type="datetimeFigureOut">
               <a:rPr lang="en-GB" smtClean="0"/>
-              <a:t>13/02/2021</a:t>
+              <a:t>16/02/2021</a:t>
             </a:fld>
             <a:endParaRPr lang="en-GB"/>
           </a:p>
@@ -3949,7 +3954,6 @@
       <p:pic>
         <p:nvPicPr>
           <p:cNvPr id="15" name="Picture 14" descr="Diagram, schematic&#10;&#10;Description automatically generated">
-            <a:hlinkClick r:id="rId2" action="ppaction://hlinksldjump"/>
             <a:extLst>
               <a:ext uri="{FF2B5EF4-FFF2-40B4-BE49-F238E27FC236}">
                 <a16:creationId xmlns:a16="http://schemas.microsoft.com/office/drawing/2014/main" id="{679B060F-E51D-4603-94AA-ACCAFB102B37}"/>
@@ -3962,7 +3966,7 @@
           <p:nvPr/>
         </p:nvPicPr>
         <p:blipFill>
-          <a:blip r:embed="rId3">
+          <a:blip r:embed="rId2">
             <a:extLst>
               <a:ext uri="{28A0092B-C50C-407E-A947-70E740481C1C}">
                 <a14:useLocalDpi xmlns:a14="http://schemas.microsoft.com/office/drawing/2010/main" val="0"/>
@@ -4067,72 +4071,608 @@
           <a:chExt cx="0" cy="0"/>
         </a:xfrm>
       </p:grpSpPr>
-      <p:pic>
-        <p:nvPicPr>
-          <p:cNvPr id="15" name="Picture 14" descr="Diagram, schematic&#10;&#10;Description automatically generated">
-            <a:extLst>
-              <a:ext uri="{FF2B5EF4-FFF2-40B4-BE49-F238E27FC236}">
-                <a16:creationId xmlns:a16="http://schemas.microsoft.com/office/drawing/2014/main" id="{679B060F-E51D-4603-94AA-ACCAFB102B37}"/>
-              </a:ext>
-            </a:extLst>
-          </p:cNvPr>
-          <p:cNvPicPr>
-            <a:picLocks noChangeAspect="1"/>
-          </p:cNvPicPr>
+      <p:sp>
+        <p:nvSpPr>
+          <p:cNvPr id="7" name="Half Frame 6">
+            <a:extLst>
+              <a:ext uri="{FF2B5EF4-FFF2-40B4-BE49-F238E27FC236}">
+                <a16:creationId xmlns:a16="http://schemas.microsoft.com/office/drawing/2014/main" id="{D41C64A7-D52E-4BAF-9E57-D104E36ACCD4}"/>
+              </a:ext>
+            </a:extLst>
+          </p:cNvPr>
+          <p:cNvSpPr/>
           <p:nvPr/>
-        </p:nvPicPr>
-        <p:blipFill>
-          <a:blip r:embed="rId2">
-            <a:extLst>
-              <a:ext uri="{28A0092B-C50C-407E-A947-70E740481C1C}">
-                <a14:useLocalDpi xmlns:a14="http://schemas.microsoft.com/office/drawing/2010/main" val="0"/>
-              </a:ext>
-            </a:extLst>
-          </a:blip>
-          <a:stretch>
-            <a:fillRect/>
-          </a:stretch>
-        </p:blipFill>
+        </p:nvSpPr>
+        <p:spPr>
+          <a:xfrm rot="5400000">
+            <a:off x="4081668" y="-1789043"/>
+            <a:ext cx="6321289" cy="9899375"/>
+          </a:xfrm>
+          <a:prstGeom prst="halfFrame">
+            <a:avLst>
+              <a:gd name="adj1" fmla="val 9383"/>
+              <a:gd name="adj2" fmla="val 7684"/>
+            </a:avLst>
+          </a:prstGeom>
+          <a:solidFill>
+            <a:schemeClr val="accent4"/>
+          </a:solidFill>
+          <a:ln>
+            <a:noFill/>
+          </a:ln>
+          <a:effectLst>
+            <a:outerShdw blurRad="107950" dist="12700" dir="5400000" algn="ctr">
+              <a:srgbClr val="000000"/>
+            </a:outerShdw>
+          </a:effectLst>
+          <a:scene3d>
+            <a:camera prst="orthographicFront">
+              <a:rot lat="0" lon="0" rev="0"/>
+            </a:camera>
+            <a:lightRig rig="soft" dir="t">
+              <a:rot lat="0" lon="0" rev="0"/>
+            </a:lightRig>
+          </a:scene3d>
+          <a:sp3d contourW="44450" prstMaterial="matte">
+            <a:bevelT w="63500" h="63500" prst="artDeco"/>
+            <a:contourClr>
+              <a:srgbClr val="FFFFFF"/>
+            </a:contourClr>
+          </a:sp3d>
+        </p:spPr>
+        <p:style>
+          <a:lnRef idx="2">
+            <a:schemeClr val="accent1">
+              <a:shade val="50000"/>
+            </a:schemeClr>
+          </a:lnRef>
+          <a:fillRef idx="1">
+            <a:schemeClr val="accent1"/>
+          </a:fillRef>
+          <a:effectRef idx="0">
+            <a:schemeClr val="accent1"/>
+          </a:effectRef>
+          <a:fontRef idx="minor">
+            <a:schemeClr val="lt1"/>
+          </a:fontRef>
+        </p:style>
+        <p:txBody>
+          <a:bodyPr rtlCol="0" anchor="ctr"/>
+          <a:lstStyle/>
+          <a:p>
+            <a:pPr algn="ctr"/>
+            <a:endParaRPr lang="en-GB" dirty="0">
+              <a:solidFill>
+                <a:schemeClr val="tx1"/>
+              </a:solidFill>
+            </a:endParaRPr>
+          </a:p>
+        </p:txBody>
+      </p:sp>
+      <p:sp>
+        <p:nvSpPr>
+          <p:cNvPr id="2" name="Rectangle 1">
+            <a:extLst>
+              <a:ext uri="{FF2B5EF4-FFF2-40B4-BE49-F238E27FC236}">
+                <a16:creationId xmlns:a16="http://schemas.microsoft.com/office/drawing/2014/main" id="{6BC20906-65B0-45A7-BF7F-6FB414983EEB}"/>
+              </a:ext>
+            </a:extLst>
+          </p:cNvPr>
+          <p:cNvSpPr/>
+          <p:nvPr/>
+        </p:nvSpPr>
         <p:spPr>
           <a:xfrm>
-            <a:off x="866302" y="66248"/>
-            <a:ext cx="10459396" cy="6725504"/>
+            <a:off x="277586" y="536711"/>
+            <a:ext cx="3185487" cy="923330"/>
           </a:xfrm>
           <a:prstGeom prst="rect">
             <a:avLst/>
           </a:prstGeom>
-          <a:ln w="190500" cap="sq">
-            <a:solidFill>
-              <a:srgbClr val="C8C6BD"/>
-            </a:solidFill>
-            <a:prstDash val="solid"/>
-            <a:miter lim="800000"/>
-          </a:ln>
-          <a:effectLst>
-            <a:outerShdw blurRad="254000" algn="bl" rotWithShape="0">
-              <a:srgbClr val="000000">
-                <a:alpha val="43000"/>
-              </a:srgbClr>
-            </a:outerShdw>
-          </a:effectLst>
+          <a:noFill/>
+        </p:spPr>
+        <p:txBody>
+          <a:bodyPr wrap="none" lIns="91440" tIns="45720" rIns="91440" bIns="45720">
+            <a:spAutoFit/>
+            <a:scene3d>
+              <a:camera prst="orthographicFront"/>
+              <a:lightRig rig="harsh" dir="t"/>
+            </a:scene3d>
+            <a:sp3d extrusionH="57150" prstMaterial="matte">
+              <a:bevelT w="63500" h="12700" prst="angle"/>
+              <a:contourClr>
+                <a:schemeClr val="bg1">
+                  <a:lumMod val="65000"/>
+                </a:schemeClr>
+              </a:contourClr>
+            </a:sp3d>
+          </a:bodyPr>
+          <a:lstStyle/>
+          <a:p>
+            <a:pPr algn="ctr"/>
+            <a:r>
+              <a:rPr lang="en-US" sz="5400" b="1" u="sng" dirty="0">
+                <a:ln/>
+                <a:solidFill>
+                  <a:schemeClr val="accent3"/>
+                </a:solidFill>
+              </a:rPr>
+              <a:t>3D design:</a:t>
+            </a:r>
+            <a:endParaRPr lang="en-US" sz="5400" b="1" u="sng" cap="none" spc="0" dirty="0">
+              <a:ln/>
+              <a:solidFill>
+                <a:schemeClr val="accent3"/>
+              </a:solidFill>
+              <a:effectLst/>
+            </a:endParaRPr>
+          </a:p>
+        </p:txBody>
+      </p:sp>
+      <p:sp>
+        <p:nvSpPr>
+          <p:cNvPr id="4" name="Rectangle 3">
+            <a:extLst>
+              <a:ext uri="{FF2B5EF4-FFF2-40B4-BE49-F238E27FC236}">
+                <a16:creationId xmlns:a16="http://schemas.microsoft.com/office/drawing/2014/main" id="{94E9AB3A-9C51-4D33-BE3B-F19E2BA3B830}"/>
+              </a:ext>
+            </a:extLst>
+          </p:cNvPr>
+          <p:cNvSpPr/>
+          <p:nvPr/>
+        </p:nvSpPr>
+        <p:spPr>
+          <a:xfrm>
+            <a:off x="7041036" y="2412955"/>
+            <a:ext cx="3939821" cy="4131734"/>
+          </a:xfrm>
+          <a:prstGeom prst="rect">
+            <a:avLst/>
+          </a:prstGeom>
+          <a:noFill/>
+          <a:ln w="38100"/>
           <a:scene3d>
-            <a:camera prst="perspectiveFront" fov="5400000"/>
-            <a:lightRig rig="threePt" dir="t">
-              <a:rot lat="0" lon="0" rev="2100000"/>
-            </a:lightRig>
+            <a:camera prst="orthographicFront"/>
+            <a:lightRig rig="threePt" dir="t"/>
           </a:scene3d>
-          <a:sp3d extrusionH="25400">
-            <a:bevelT w="304800" h="152400" prst="hardEdge"/>
-            <a:extrusionClr>
-              <a:srgbClr val="000000"/>
-            </a:extrusionClr>
+          <a:sp3d>
+            <a:bevelT/>
           </a:sp3d>
         </p:spPr>
-      </p:pic>
+        <p:style>
+          <a:lnRef idx="2">
+            <a:schemeClr val="accent1">
+              <a:shade val="50000"/>
+            </a:schemeClr>
+          </a:lnRef>
+          <a:fillRef idx="1">
+            <a:schemeClr val="accent1"/>
+          </a:fillRef>
+          <a:effectRef idx="0">
+            <a:schemeClr val="accent1"/>
+          </a:effectRef>
+          <a:fontRef idx="minor">
+            <a:schemeClr val="lt1"/>
+          </a:fontRef>
+        </p:style>
+        <p:txBody>
+          <a:bodyPr rtlCol="0" anchor="ctr"/>
+          <a:lstStyle/>
+          <a:p>
+            <a:pPr algn="ctr"/>
+            <a:endParaRPr lang="en-GB"/>
+          </a:p>
+        </p:txBody>
+      </p:sp>
+      <mc:AlternateContent xmlns:mc="http://schemas.openxmlformats.org/markup-compatibility/2006">
+        <mc:Choice xmlns:am3d="http://schemas.microsoft.com/office/drawing/2017/model3d" Requires="am3d">
+          <p:graphicFrame>
+            <p:nvGraphicFramePr>
+              <p:cNvPr id="8" name="3D Model 7">
+                <a:extLst>
+                  <a:ext uri="{FF2B5EF4-FFF2-40B4-BE49-F238E27FC236}">
+                    <a16:creationId xmlns:a16="http://schemas.microsoft.com/office/drawing/2014/main" id="{E30EF49C-E632-48B0-B191-F6FF7F79ABCF}"/>
+                  </a:ext>
+                </a:extLst>
+              </p:cNvPr>
+              <p:cNvGraphicFramePr>
+                <a:graphicFrameLocks noChangeAspect="1"/>
+              </p:cNvGraphicFramePr>
+              <p:nvPr>
+                <p:extLst>
+                  <p:ext uri="{D42A27DB-BD31-4B8C-83A1-F6EECF244321}">
+                    <p14:modId xmlns:p14="http://schemas.microsoft.com/office/powerpoint/2010/main" val="3203277595"/>
+                  </p:ext>
+                </p:extLst>
+              </p:nvPr>
+            </p:nvGraphicFramePr>
+            <p:xfrm>
+              <a:off x="1471715" y="2777743"/>
+              <a:ext cx="2798057" cy="3479316"/>
+            </p:xfrm>
+            <a:graphic>
+              <a:graphicData uri="http://schemas.microsoft.com/office/drawing/2017/model3d">
+                <am3d:model3d r:embed="rId2">
+                  <am3d:spPr>
+                    <a:xfrm>
+                      <a:off x="0" y="0"/>
+                      <a:ext cx="2798057" cy="3479316"/>
+                    </a:xfrm>
+                    <a:prstGeom prst="rect">
+                      <a:avLst/>
+                    </a:prstGeom>
+                  </am3d:spPr>
+                  <am3d:camera>
+                    <am3d:pos x="0" y="0" z="72184072"/>
+                    <am3d:up dx="0" dy="36000000" dz="0"/>
+                    <am3d:lookAt x="0" y="0" z="0"/>
+                    <am3d:perspective fov="2700000"/>
+                  </am3d:camera>
+                  <am3d:trans>
+                    <am3d:meterPerModelUnit n="400000" d="1000000"/>
+                    <am3d:preTrans dx="-10691" dy="-3599999" dz="811771"/>
+                    <am3d:scale>
+                      <am3d:sx n="1000000" d="1000000"/>
+                      <am3d:sy n="1000000" d="1000000"/>
+                      <am3d:sz n="1000000" d="1000000"/>
+                    </am3d:scale>
+                    <am3d:rot ay="10800000"/>
+                    <am3d:postTrans dx="0" dy="0" dz="0"/>
+                  </am3d:trans>
+                  <am3d:raster rName="Office3DRenderer" rVer="16.0.8326">
+                    <am3d:blip r:embed="rId3"/>
+                  </am3d:raster>
+                  <am3d:objViewport viewportSz="4582050"/>
+                  <am3d:ambientLight>
+                    <am3d:clr>
+                      <a:scrgbClr r="50000" g="50000" b="50000"/>
+                    </am3d:clr>
+                    <am3d:illuminance n="500000" d="1000000"/>
+                  </am3d:ambientLight>
+                  <am3d:ptLight rad="0">
+                    <am3d:clr>
+                      <a:scrgbClr r="100000" g="75000" b="50000"/>
+                    </am3d:clr>
+                    <am3d:intensity n="9765625" d="1000000"/>
+                    <am3d:pos x="21959998" y="70920001" z="16344003"/>
+                  </am3d:ptLight>
+                  <am3d:ptLight rad="0">
+                    <am3d:clr>
+                      <a:scrgbClr r="40000" g="60000" b="95000"/>
+                    </am3d:clr>
+                    <am3d:intensity n="12250000" d="1000000"/>
+                    <am3d:pos x="-37964106" y="51130435" z="57631972"/>
+                  </am3d:ptLight>
+                  <am3d:ptLight rad="0">
+                    <am3d:clr>
+                      <a:scrgbClr r="86837" g="72700" b="100000"/>
+                    </am3d:clr>
+                    <am3d:intensity n="3125000" d="1000000"/>
+                    <am3d:pos x="-37739122" y="58056624" z="-34769649"/>
+                  </am3d:ptLight>
+                </am3d:model3d>
+              </a:graphicData>
+            </a:graphic>
+          </p:graphicFrame>
+        </mc:Choice>
+        <mc:Fallback>
+          <p:pic>
+            <p:nvPicPr>
+              <p:cNvPr id="8" name="3D Model 7">
+                <a:extLst>
+                  <a:ext uri="{FF2B5EF4-FFF2-40B4-BE49-F238E27FC236}">
+                    <a16:creationId xmlns:a16="http://schemas.microsoft.com/office/drawing/2014/main" id="{E30EF49C-E632-48B0-B191-F6FF7F79ABCF}"/>
+                  </a:ext>
+                </a:extLst>
+              </p:cNvPr>
+              <p:cNvPicPr>
+                <a:picLocks noGrp="1" noRot="1" noChangeAspect="1" noMove="1" noResize="1" noEditPoints="1" noAdjustHandles="1" noChangeArrowheads="1" noChangeShapeType="1" noCrop="1"/>
+              </p:cNvPicPr>
+              <p:nvPr/>
+            </p:nvPicPr>
+            <p:blipFill>
+              <a:blip r:embed="rId3"/>
+              <a:stretch>
+                <a:fillRect/>
+              </a:stretch>
+            </p:blipFill>
+            <p:spPr>
+              <a:xfrm>
+                <a:off x="1471715" y="2777743"/>
+                <a:ext cx="2798057" cy="3479316"/>
+              </a:xfrm>
+              <a:prstGeom prst="rect">
+                <a:avLst/>
+              </a:prstGeom>
+            </p:spPr>
+          </p:pic>
+        </mc:Fallback>
+      </mc:AlternateContent>
+      <mc:AlternateContent xmlns:mc="http://schemas.openxmlformats.org/markup-compatibility/2006">
+        <mc:Choice xmlns:am3d="http://schemas.microsoft.com/office/drawing/2017/model3d" Requires="am3d">
+          <p:graphicFrame>
+            <p:nvGraphicFramePr>
+              <p:cNvPr id="9" name="3D Model 8">
+                <a:extLst>
+                  <a:ext uri="{FF2B5EF4-FFF2-40B4-BE49-F238E27FC236}">
+                    <a16:creationId xmlns:a16="http://schemas.microsoft.com/office/drawing/2014/main" id="{20578DDB-6861-4E31-AB19-E3A041848341}"/>
+                  </a:ext>
+                </a:extLst>
+              </p:cNvPr>
+              <p:cNvGraphicFramePr>
+                <a:graphicFrameLocks noChangeAspect="1"/>
+              </p:cNvGraphicFramePr>
+              <p:nvPr>
+                <p:extLst>
+                  <p:ext uri="{D42A27DB-BD31-4B8C-83A1-F6EECF244321}">
+                    <p14:modId xmlns:p14="http://schemas.microsoft.com/office/powerpoint/2010/main" val="4092326809"/>
+                  </p:ext>
+                </p:extLst>
+              </p:nvPr>
+            </p:nvGraphicFramePr>
+            <p:xfrm>
+              <a:off x="7608513" y="2796756"/>
+              <a:ext cx="2813205" cy="3441289"/>
+            </p:xfrm>
+            <a:graphic>
+              <a:graphicData uri="http://schemas.microsoft.com/office/drawing/2017/model3d">
+                <am3d:model3d r:embed="rId4">
+                  <am3d:spPr>
+                    <a:xfrm>
+                      <a:off x="0" y="0"/>
+                      <a:ext cx="2813205" cy="3441289"/>
+                    </a:xfrm>
+                    <a:prstGeom prst="rect">
+                      <a:avLst/>
+                    </a:prstGeom>
+                  </am3d:spPr>
+                  <am3d:camera>
+                    <am3d:pos x="0" y="0" z="73132759"/>
+                    <am3d:up dx="0" dy="36000000" dz="0"/>
+                    <am3d:lookAt x="0" y="0" z="0"/>
+                    <am3d:perspective fov="2700000"/>
+                  </am3d:camera>
+                  <am3d:trans>
+                    <am3d:meterPerModelUnit n="400000" d="1000000"/>
+                    <am3d:preTrans dx="-118092916" dy="-3600000" dz="162036"/>
+                    <am3d:scale>
+                      <am3d:sx n="1000000" d="1000000"/>
+                      <am3d:sy n="1000000" d="1000000"/>
+                      <am3d:sz n="1000000" d="1000000"/>
+                    </am3d:scale>
+                    <am3d:rot ax="-10746767" ay="-23709" az="10799628"/>
+                    <am3d:postTrans dx="0" dy="0" dz="0"/>
+                  </am3d:trans>
+                  <am3d:raster rName="Office3DRenderer" rVer="16.0.8326">
+                    <am3d:blip r:embed="rId5"/>
+                  </am3d:raster>
+                  <am3d:objViewport viewportSz="4582048"/>
+                  <am3d:ambientLight>
+                    <am3d:clr>
+                      <a:scrgbClr r="50000" g="50000" b="50000"/>
+                    </am3d:clr>
+                    <am3d:illuminance n="500000" d="1000000"/>
+                  </am3d:ambientLight>
+                  <am3d:ptLight rad="0">
+                    <am3d:clr>
+                      <a:scrgbClr r="100000" g="75000" b="50000"/>
+                    </am3d:clr>
+                    <am3d:intensity n="9765625" d="1000000"/>
+                    <am3d:pos x="21959998" y="70920001" z="16344003"/>
+                  </am3d:ptLight>
+                  <am3d:ptLight rad="0">
+                    <am3d:clr>
+                      <a:scrgbClr r="40000" g="60000" b="95000"/>
+                    </am3d:clr>
+                    <am3d:intensity n="12250000" d="1000000"/>
+                    <am3d:pos x="-37964106" y="51130435" z="57631972"/>
+                  </am3d:ptLight>
+                  <am3d:ptLight rad="0">
+                    <am3d:clr>
+                      <a:scrgbClr r="86837" g="72700" b="100000"/>
+                    </am3d:clr>
+                    <am3d:intensity n="3125000" d="1000000"/>
+                    <am3d:pos x="-37739122" y="58056624" z="-34769649"/>
+                  </am3d:ptLight>
+                </am3d:model3d>
+              </a:graphicData>
+            </a:graphic>
+          </p:graphicFrame>
+        </mc:Choice>
+        <mc:Fallback>
+          <p:pic>
+            <p:nvPicPr>
+              <p:cNvPr id="9" name="3D Model 8">
+                <a:extLst>
+                  <a:ext uri="{FF2B5EF4-FFF2-40B4-BE49-F238E27FC236}">
+                    <a16:creationId xmlns:a16="http://schemas.microsoft.com/office/drawing/2014/main" id="{20578DDB-6861-4E31-AB19-E3A041848341}"/>
+                  </a:ext>
+                </a:extLst>
+              </p:cNvPr>
+              <p:cNvPicPr>
+                <a:picLocks noGrp="1" noRot="1" noChangeAspect="1" noMove="1" noResize="1" noEditPoints="1" noAdjustHandles="1" noChangeArrowheads="1" noChangeShapeType="1" noCrop="1"/>
+              </p:cNvPicPr>
+              <p:nvPr/>
+            </p:nvPicPr>
+            <p:blipFill>
+              <a:blip r:embed="rId5"/>
+              <a:stretch>
+                <a:fillRect/>
+              </a:stretch>
+            </p:blipFill>
+            <p:spPr>
+              <a:xfrm>
+                <a:off x="7608513" y="2796756"/>
+                <a:ext cx="2813205" cy="3441289"/>
+              </a:xfrm>
+              <a:prstGeom prst="rect">
+                <a:avLst/>
+              </a:prstGeom>
+            </p:spPr>
+          </p:pic>
+        </mc:Fallback>
+      </mc:AlternateContent>
+      <p:sp>
+        <p:nvSpPr>
+          <p:cNvPr id="10" name="Rectangle 9">
+            <a:extLst>
+              <a:ext uri="{FF2B5EF4-FFF2-40B4-BE49-F238E27FC236}">
+                <a16:creationId xmlns:a16="http://schemas.microsoft.com/office/drawing/2014/main" id="{F33037CA-8296-497D-AF4C-D5DEC45C9913}"/>
+              </a:ext>
+            </a:extLst>
+          </p:cNvPr>
+          <p:cNvSpPr/>
+          <p:nvPr/>
+        </p:nvSpPr>
+        <p:spPr>
+          <a:xfrm>
+            <a:off x="900835" y="2412955"/>
+            <a:ext cx="3939821" cy="4131734"/>
+          </a:xfrm>
+          <a:prstGeom prst="rect">
+            <a:avLst/>
+          </a:prstGeom>
+          <a:noFill/>
+          <a:ln w="38100"/>
+          <a:scene3d>
+            <a:camera prst="orthographicFront"/>
+            <a:lightRig rig="threePt" dir="t"/>
+          </a:scene3d>
+          <a:sp3d>
+            <a:bevelT/>
+          </a:sp3d>
+        </p:spPr>
+        <p:style>
+          <a:lnRef idx="2">
+            <a:schemeClr val="accent1">
+              <a:shade val="50000"/>
+            </a:schemeClr>
+          </a:lnRef>
+          <a:fillRef idx="1">
+            <a:schemeClr val="accent1"/>
+          </a:fillRef>
+          <a:effectRef idx="0">
+            <a:schemeClr val="accent1"/>
+          </a:effectRef>
+          <a:fontRef idx="minor">
+            <a:schemeClr val="lt1"/>
+          </a:fontRef>
+        </p:style>
+        <p:txBody>
+          <a:bodyPr rtlCol="0" anchor="ctr"/>
+          <a:lstStyle/>
+          <a:p>
+            <a:pPr algn="ctr"/>
+            <a:endParaRPr lang="en-GB"/>
+          </a:p>
+        </p:txBody>
+      </p:sp>
+      <p:sp>
+        <p:nvSpPr>
+          <p:cNvPr id="11" name="Rectangle 10">
+            <a:extLst>
+              <a:ext uri="{FF2B5EF4-FFF2-40B4-BE49-F238E27FC236}">
+                <a16:creationId xmlns:a16="http://schemas.microsoft.com/office/drawing/2014/main" id="{6780CAD0-BF36-41E8-B80C-CF5B59030200}"/>
+              </a:ext>
+            </a:extLst>
+          </p:cNvPr>
+          <p:cNvSpPr/>
+          <p:nvPr/>
+        </p:nvSpPr>
+        <p:spPr>
+          <a:xfrm>
+            <a:off x="1554433" y="1489625"/>
+            <a:ext cx="2111475" cy="923330"/>
+          </a:xfrm>
+          <a:prstGeom prst="rect">
+            <a:avLst/>
+          </a:prstGeom>
+          <a:noFill/>
+        </p:spPr>
+        <p:txBody>
+          <a:bodyPr wrap="none" lIns="91440" tIns="45720" rIns="91440" bIns="45720">
+            <a:spAutoFit/>
+            <a:scene3d>
+              <a:camera prst="orthographicFront"/>
+              <a:lightRig rig="soft" dir="t">
+                <a:rot lat="0" lon="0" rev="15600000"/>
+              </a:lightRig>
+            </a:scene3d>
+            <a:sp3d extrusionH="57150" prstMaterial="softEdge">
+              <a:bevelT w="25400" h="38100"/>
+            </a:sp3d>
+          </a:bodyPr>
+          <a:lstStyle/>
+          <a:p>
+            <a:pPr algn="ctr"/>
+            <a:r>
+              <a:rPr lang="en-US" sz="5400" b="1" cap="none" spc="0" dirty="0">
+                <a:ln/>
+                <a:solidFill>
+                  <a:schemeClr val="accent4"/>
+                </a:solidFill>
+                <a:effectLst/>
+              </a:rPr>
+              <a:t>INSIDE</a:t>
+            </a:r>
+          </a:p>
+        </p:txBody>
+      </p:sp>
+      <p:sp>
+        <p:nvSpPr>
+          <p:cNvPr id="12" name="Rectangle 11">
+            <a:extLst>
+              <a:ext uri="{FF2B5EF4-FFF2-40B4-BE49-F238E27FC236}">
+                <a16:creationId xmlns:a16="http://schemas.microsoft.com/office/drawing/2014/main" id="{79D6FA1F-38F3-48B0-B168-7E4858E1DF67}"/>
+              </a:ext>
+            </a:extLst>
+          </p:cNvPr>
+          <p:cNvSpPr/>
+          <p:nvPr/>
+        </p:nvSpPr>
+        <p:spPr>
+          <a:xfrm>
+            <a:off x="7645924" y="1489625"/>
+            <a:ext cx="2730043" cy="923330"/>
+          </a:xfrm>
+          <a:prstGeom prst="rect">
+            <a:avLst/>
+          </a:prstGeom>
+          <a:noFill/>
+        </p:spPr>
+        <p:txBody>
+          <a:bodyPr wrap="none" lIns="91440" tIns="45720" rIns="91440" bIns="45720">
+            <a:spAutoFit/>
+            <a:scene3d>
+              <a:camera prst="orthographicFront"/>
+              <a:lightRig rig="soft" dir="t">
+                <a:rot lat="0" lon="0" rev="15600000"/>
+              </a:lightRig>
+            </a:scene3d>
+            <a:sp3d extrusionH="57150" prstMaterial="softEdge">
+              <a:bevelT w="25400" h="38100"/>
+            </a:sp3d>
+          </a:bodyPr>
+          <a:lstStyle/>
+          <a:p>
+            <a:pPr algn="ctr"/>
+            <a:r>
+              <a:rPr lang="en-US" sz="5400" b="1" cap="none" spc="0" dirty="0">
+                <a:ln/>
+                <a:solidFill>
+                  <a:schemeClr val="accent4"/>
+                </a:solidFill>
+                <a:effectLst/>
+              </a:rPr>
+              <a:t>OUTSIDE</a:t>
+            </a:r>
+          </a:p>
+        </p:txBody>
+      </p:sp>
     </p:spTree>
     <p:extLst>
       <p:ext uri="{BB962C8B-B14F-4D97-AF65-F5344CB8AC3E}">
-        <p14:creationId xmlns:p14="http://schemas.microsoft.com/office/powerpoint/2010/main" val="131469442"/>
+        <p14:creationId xmlns:p14="http://schemas.microsoft.com/office/powerpoint/2010/main" val="3467314677"/>
       </p:ext>
     </p:extLst>
   </p:cSld>
@@ -4325,16 +4865,488 @@
           </a:p>
         </p:txBody>
       </p:sp>
+      <p:sp>
+        <p:nvSpPr>
+          <p:cNvPr id="4" name="Rectangle 3">
+            <a:extLst>
+              <a:ext uri="{FF2B5EF4-FFF2-40B4-BE49-F238E27FC236}">
+                <a16:creationId xmlns:a16="http://schemas.microsoft.com/office/drawing/2014/main" id="{94E9AB3A-9C51-4D33-BE3B-F19E2BA3B830}"/>
+              </a:ext>
+            </a:extLst>
+          </p:cNvPr>
+          <p:cNvSpPr/>
+          <p:nvPr/>
+        </p:nvSpPr>
+        <p:spPr>
+          <a:xfrm>
+            <a:off x="7041036" y="2412955"/>
+            <a:ext cx="3939821" cy="4131734"/>
+          </a:xfrm>
+          <a:prstGeom prst="rect">
+            <a:avLst/>
+          </a:prstGeom>
+          <a:noFill/>
+          <a:ln w="38100"/>
+          <a:scene3d>
+            <a:camera prst="orthographicFront"/>
+            <a:lightRig rig="threePt" dir="t"/>
+          </a:scene3d>
+          <a:sp3d>
+            <a:bevelT/>
+          </a:sp3d>
+        </p:spPr>
+        <p:style>
+          <a:lnRef idx="2">
+            <a:schemeClr val="accent1">
+              <a:shade val="50000"/>
+            </a:schemeClr>
+          </a:lnRef>
+          <a:fillRef idx="1">
+            <a:schemeClr val="accent1"/>
+          </a:fillRef>
+          <a:effectRef idx="0">
+            <a:schemeClr val="accent1"/>
+          </a:effectRef>
+          <a:fontRef idx="minor">
+            <a:schemeClr val="lt1"/>
+          </a:fontRef>
+        </p:style>
+        <p:txBody>
+          <a:bodyPr rtlCol="0" anchor="ctr"/>
+          <a:lstStyle/>
+          <a:p>
+            <a:pPr algn="ctr"/>
+            <a:endParaRPr lang="en-GB"/>
+          </a:p>
+        </p:txBody>
+      </p:sp>
+      <mc:AlternateContent xmlns:mc="http://schemas.openxmlformats.org/markup-compatibility/2006">
+        <mc:Choice xmlns:am3d="http://schemas.microsoft.com/office/drawing/2017/model3d" Requires="am3d">
+          <p:graphicFrame>
+            <p:nvGraphicFramePr>
+              <p:cNvPr id="8" name="3D Model 7">
+                <a:extLst>
+                  <a:ext uri="{FF2B5EF4-FFF2-40B4-BE49-F238E27FC236}">
+                    <a16:creationId xmlns:a16="http://schemas.microsoft.com/office/drawing/2014/main" id="{E30EF49C-E632-48B0-B191-F6FF7F79ABCF}"/>
+                  </a:ext>
+                </a:extLst>
+              </p:cNvPr>
+              <p:cNvGraphicFramePr>
+                <a:graphicFrameLocks noChangeAspect="1"/>
+              </p:cNvGraphicFramePr>
+              <p:nvPr>
+                <p:extLst>
+                  <p:ext uri="{D42A27DB-BD31-4B8C-83A1-F6EECF244321}">
+                    <p14:modId xmlns:p14="http://schemas.microsoft.com/office/powerpoint/2010/main" val="1565340743"/>
+                  </p:ext>
+                </p:extLst>
+              </p:nvPr>
+            </p:nvGraphicFramePr>
+            <p:xfrm>
+              <a:off x="1471714" y="2769912"/>
+              <a:ext cx="2798057" cy="3494976"/>
+            </p:xfrm>
+            <a:graphic>
+              <a:graphicData uri="http://schemas.microsoft.com/office/drawing/2017/model3d">
+                <am3d:model3d r:embed="rId2">
+                  <am3d:spPr>
+                    <a:xfrm>
+                      <a:off x="0" y="0"/>
+                      <a:ext cx="2798057" cy="3494976"/>
+                    </a:xfrm>
+                    <a:prstGeom prst="rect">
+                      <a:avLst/>
+                    </a:prstGeom>
+                  </am3d:spPr>
+                  <am3d:camera>
+                    <am3d:pos x="0" y="0" z="72184072"/>
+                    <am3d:up dx="0" dy="36000000" dz="0"/>
+                    <am3d:lookAt x="0" y="0" z="0"/>
+                    <am3d:perspective fov="2700000"/>
+                  </am3d:camera>
+                  <am3d:trans>
+                    <am3d:meterPerModelUnit n="400000" d="1000000"/>
+                    <am3d:preTrans dx="-10691" dy="-3599999" dz="811771"/>
+                    <am3d:scale>
+                      <am3d:sx n="1000000" d="1000000"/>
+                      <am3d:sy n="1000000" d="1000000"/>
+                      <am3d:sz n="1000000" d="1000000"/>
+                    </am3d:scale>
+                    <am3d:rot/>
+                    <am3d:postTrans dx="0" dy="0" dz="0"/>
+                  </am3d:trans>
+                  <am3d:raster rName="Office3DRenderer" rVer="16.0.8326">
+                    <am3d:blip r:embed="rId3"/>
+                  </am3d:raster>
+                  <am3d:objViewport viewportSz="4582050"/>
+                  <am3d:ambientLight>
+                    <am3d:clr>
+                      <a:scrgbClr r="50000" g="50000" b="50000"/>
+                    </am3d:clr>
+                    <am3d:illuminance n="500000" d="1000000"/>
+                  </am3d:ambientLight>
+                  <am3d:ptLight rad="0">
+                    <am3d:clr>
+                      <a:scrgbClr r="100000" g="75000" b="50000"/>
+                    </am3d:clr>
+                    <am3d:intensity n="9765625" d="1000000"/>
+                    <am3d:pos x="21959998" y="70920001" z="16344003"/>
+                  </am3d:ptLight>
+                  <am3d:ptLight rad="0">
+                    <am3d:clr>
+                      <a:scrgbClr r="40000" g="60000" b="95000"/>
+                    </am3d:clr>
+                    <am3d:intensity n="12250000" d="1000000"/>
+                    <am3d:pos x="-37964106" y="51130435" z="57631972"/>
+                  </am3d:ptLight>
+                  <am3d:ptLight rad="0">
+                    <am3d:clr>
+                      <a:scrgbClr r="86837" g="72700" b="100000"/>
+                    </am3d:clr>
+                    <am3d:intensity n="3125000" d="1000000"/>
+                    <am3d:pos x="-37739122" y="58056624" z="-34769649"/>
+                  </am3d:ptLight>
+                </am3d:model3d>
+              </a:graphicData>
+            </a:graphic>
+          </p:graphicFrame>
+        </mc:Choice>
+        <mc:Fallback>
+          <p:pic>
+            <p:nvPicPr>
+              <p:cNvPr id="8" name="3D Model 7">
+                <a:extLst>
+                  <a:ext uri="{FF2B5EF4-FFF2-40B4-BE49-F238E27FC236}">
+                    <a16:creationId xmlns:a16="http://schemas.microsoft.com/office/drawing/2014/main" id="{E30EF49C-E632-48B0-B191-F6FF7F79ABCF}"/>
+                  </a:ext>
+                </a:extLst>
+              </p:cNvPr>
+              <p:cNvPicPr>
+                <a:picLocks noGrp="1" noRot="1" noChangeAspect="1" noMove="1" noResize="1" noEditPoints="1" noAdjustHandles="1" noChangeArrowheads="1" noChangeShapeType="1" noCrop="1"/>
+              </p:cNvPicPr>
+              <p:nvPr/>
+            </p:nvPicPr>
+            <p:blipFill>
+              <a:blip r:embed="rId3"/>
+              <a:stretch>
+                <a:fillRect/>
+              </a:stretch>
+            </p:blipFill>
+            <p:spPr>
+              <a:xfrm>
+                <a:off x="1471714" y="2769912"/>
+                <a:ext cx="2798057" cy="3494976"/>
+              </a:xfrm>
+              <a:prstGeom prst="rect">
+                <a:avLst/>
+              </a:prstGeom>
+            </p:spPr>
+          </p:pic>
+        </mc:Fallback>
+      </mc:AlternateContent>
+      <mc:AlternateContent xmlns:mc="http://schemas.openxmlformats.org/markup-compatibility/2006">
+        <mc:Choice xmlns:am3d="http://schemas.microsoft.com/office/drawing/2017/model3d" Requires="am3d">
+          <p:graphicFrame>
+            <p:nvGraphicFramePr>
+              <p:cNvPr id="9" name="3D Model 8">
+                <a:extLst>
+                  <a:ext uri="{FF2B5EF4-FFF2-40B4-BE49-F238E27FC236}">
+                    <a16:creationId xmlns:a16="http://schemas.microsoft.com/office/drawing/2014/main" id="{20578DDB-6861-4E31-AB19-E3A041848341}"/>
+                  </a:ext>
+                </a:extLst>
+              </p:cNvPr>
+              <p:cNvGraphicFramePr>
+                <a:graphicFrameLocks noChangeAspect="1"/>
+              </p:cNvGraphicFramePr>
+              <p:nvPr>
+                <p:extLst>
+                  <p:ext uri="{D42A27DB-BD31-4B8C-83A1-F6EECF244321}">
+                    <p14:modId xmlns:p14="http://schemas.microsoft.com/office/powerpoint/2010/main" val="1119603890"/>
+                  </p:ext>
+                </p:extLst>
+              </p:nvPr>
+            </p:nvGraphicFramePr>
+            <p:xfrm>
+              <a:off x="7654267" y="2817603"/>
+              <a:ext cx="2721699" cy="3399597"/>
+            </p:xfrm>
+            <a:graphic>
+              <a:graphicData uri="http://schemas.microsoft.com/office/drawing/2017/model3d">
+                <am3d:model3d r:embed="rId4">
+                  <am3d:spPr>
+                    <a:xfrm>
+                      <a:off x="0" y="0"/>
+                      <a:ext cx="2721699" cy="3399597"/>
+                    </a:xfrm>
+                    <a:prstGeom prst="rect">
+                      <a:avLst/>
+                    </a:prstGeom>
+                  </am3d:spPr>
+                  <am3d:camera>
+                    <am3d:pos x="0" y="0" z="73132759"/>
+                    <am3d:up dx="0" dy="36000000" dz="0"/>
+                    <am3d:lookAt x="0" y="0" z="0"/>
+                    <am3d:perspective fov="2700000"/>
+                  </am3d:camera>
+                  <am3d:trans>
+                    <am3d:meterPerModelUnit n="400000" d="1000000"/>
+                    <am3d:preTrans dx="-118092916" dy="-3600000" dz="162036"/>
+                    <am3d:scale>
+                      <am3d:sx n="1000000" d="1000000"/>
+                      <am3d:sy n="1000000" d="1000000"/>
+                      <am3d:sz n="1000000" d="1000000"/>
+                    </am3d:scale>
+                    <am3d:rot/>
+                    <am3d:postTrans dx="0" dy="0" dz="0"/>
+                  </am3d:trans>
+                  <am3d:raster rName="Office3DRenderer" rVer="16.0.8326">
+                    <am3d:blip r:embed="rId5"/>
+                  </am3d:raster>
+                  <am3d:objViewport viewportSz="4582049"/>
+                  <am3d:ambientLight>
+                    <am3d:clr>
+                      <a:scrgbClr r="50000" g="50000" b="50000"/>
+                    </am3d:clr>
+                    <am3d:illuminance n="500000" d="1000000"/>
+                  </am3d:ambientLight>
+                  <am3d:ptLight rad="0">
+                    <am3d:clr>
+                      <a:scrgbClr r="100000" g="75000" b="50000"/>
+                    </am3d:clr>
+                    <am3d:intensity n="9765625" d="1000000"/>
+                    <am3d:pos x="21959998" y="70920001" z="16344003"/>
+                  </am3d:ptLight>
+                  <am3d:ptLight rad="0">
+                    <am3d:clr>
+                      <a:scrgbClr r="40000" g="60000" b="95000"/>
+                    </am3d:clr>
+                    <am3d:intensity n="12250000" d="1000000"/>
+                    <am3d:pos x="-37964106" y="51130435" z="57631972"/>
+                  </am3d:ptLight>
+                  <am3d:ptLight rad="0">
+                    <am3d:clr>
+                      <a:scrgbClr r="86837" g="72700" b="100000"/>
+                    </am3d:clr>
+                    <am3d:intensity n="3125000" d="1000000"/>
+                    <am3d:pos x="-37739122" y="58056624" z="-34769649"/>
+                  </am3d:ptLight>
+                </am3d:model3d>
+              </a:graphicData>
+            </a:graphic>
+          </p:graphicFrame>
+        </mc:Choice>
+        <mc:Fallback>
+          <p:pic>
+            <p:nvPicPr>
+              <p:cNvPr id="9" name="3D Model 8">
+                <a:extLst>
+                  <a:ext uri="{FF2B5EF4-FFF2-40B4-BE49-F238E27FC236}">
+                    <a16:creationId xmlns:a16="http://schemas.microsoft.com/office/drawing/2014/main" id="{20578DDB-6861-4E31-AB19-E3A041848341}"/>
+                  </a:ext>
+                </a:extLst>
+              </p:cNvPr>
+              <p:cNvPicPr>
+                <a:picLocks noGrp="1" noRot="1" noChangeAspect="1" noMove="1" noResize="1" noEditPoints="1" noAdjustHandles="1" noChangeArrowheads="1" noChangeShapeType="1" noCrop="1"/>
+              </p:cNvPicPr>
+              <p:nvPr/>
+            </p:nvPicPr>
+            <p:blipFill>
+              <a:blip r:embed="rId5"/>
+              <a:stretch>
+                <a:fillRect/>
+              </a:stretch>
+            </p:blipFill>
+            <p:spPr>
+              <a:xfrm>
+                <a:off x="7654267" y="2817603"/>
+                <a:ext cx="2721699" cy="3399597"/>
+              </a:xfrm>
+              <a:prstGeom prst="rect">
+                <a:avLst/>
+              </a:prstGeom>
+            </p:spPr>
+          </p:pic>
+        </mc:Fallback>
+      </mc:AlternateContent>
+      <p:sp>
+        <p:nvSpPr>
+          <p:cNvPr id="10" name="Rectangle 9">
+            <a:extLst>
+              <a:ext uri="{FF2B5EF4-FFF2-40B4-BE49-F238E27FC236}">
+                <a16:creationId xmlns:a16="http://schemas.microsoft.com/office/drawing/2014/main" id="{F33037CA-8296-497D-AF4C-D5DEC45C9913}"/>
+              </a:ext>
+            </a:extLst>
+          </p:cNvPr>
+          <p:cNvSpPr/>
+          <p:nvPr/>
+        </p:nvSpPr>
+        <p:spPr>
+          <a:xfrm>
+            <a:off x="900835" y="2412955"/>
+            <a:ext cx="3939821" cy="4131734"/>
+          </a:xfrm>
+          <a:prstGeom prst="rect">
+            <a:avLst/>
+          </a:prstGeom>
+          <a:noFill/>
+          <a:ln w="38100"/>
+          <a:scene3d>
+            <a:camera prst="orthographicFront"/>
+            <a:lightRig rig="threePt" dir="t"/>
+          </a:scene3d>
+          <a:sp3d>
+            <a:bevelT/>
+          </a:sp3d>
+        </p:spPr>
+        <p:style>
+          <a:lnRef idx="2">
+            <a:schemeClr val="accent1">
+              <a:shade val="50000"/>
+            </a:schemeClr>
+          </a:lnRef>
+          <a:fillRef idx="1">
+            <a:schemeClr val="accent1"/>
+          </a:fillRef>
+          <a:effectRef idx="0">
+            <a:schemeClr val="accent1"/>
+          </a:effectRef>
+          <a:fontRef idx="minor">
+            <a:schemeClr val="lt1"/>
+          </a:fontRef>
+        </p:style>
+        <p:txBody>
+          <a:bodyPr rtlCol="0" anchor="ctr"/>
+          <a:lstStyle/>
+          <a:p>
+            <a:pPr algn="ctr"/>
+            <a:endParaRPr lang="en-GB"/>
+          </a:p>
+        </p:txBody>
+      </p:sp>
+      <p:sp>
+        <p:nvSpPr>
+          <p:cNvPr id="11" name="Rectangle 10">
+            <a:extLst>
+              <a:ext uri="{FF2B5EF4-FFF2-40B4-BE49-F238E27FC236}">
+                <a16:creationId xmlns:a16="http://schemas.microsoft.com/office/drawing/2014/main" id="{6780CAD0-BF36-41E8-B80C-CF5B59030200}"/>
+              </a:ext>
+            </a:extLst>
+          </p:cNvPr>
+          <p:cNvSpPr/>
+          <p:nvPr/>
+        </p:nvSpPr>
+        <p:spPr>
+          <a:xfrm>
+            <a:off x="1554433" y="1489625"/>
+            <a:ext cx="2111475" cy="923330"/>
+          </a:xfrm>
+          <a:prstGeom prst="rect">
+            <a:avLst/>
+          </a:prstGeom>
+          <a:noFill/>
+        </p:spPr>
+        <p:txBody>
+          <a:bodyPr wrap="none" lIns="91440" tIns="45720" rIns="91440" bIns="45720">
+            <a:spAutoFit/>
+            <a:scene3d>
+              <a:camera prst="orthographicFront"/>
+              <a:lightRig rig="soft" dir="t">
+                <a:rot lat="0" lon="0" rev="15600000"/>
+              </a:lightRig>
+            </a:scene3d>
+            <a:sp3d extrusionH="57150" prstMaterial="softEdge">
+              <a:bevelT w="25400" h="38100"/>
+            </a:sp3d>
+          </a:bodyPr>
+          <a:lstStyle/>
+          <a:p>
+            <a:pPr algn="ctr"/>
+            <a:r>
+              <a:rPr lang="en-US" sz="5400" b="1" cap="none" spc="0" dirty="0">
+                <a:ln/>
+                <a:solidFill>
+                  <a:schemeClr val="accent4"/>
+                </a:solidFill>
+                <a:effectLst/>
+              </a:rPr>
+              <a:t>INSIDE</a:t>
+            </a:r>
+          </a:p>
+        </p:txBody>
+      </p:sp>
+      <p:sp>
+        <p:nvSpPr>
+          <p:cNvPr id="12" name="Rectangle 11">
+            <a:extLst>
+              <a:ext uri="{FF2B5EF4-FFF2-40B4-BE49-F238E27FC236}">
+                <a16:creationId xmlns:a16="http://schemas.microsoft.com/office/drawing/2014/main" id="{79D6FA1F-38F3-48B0-B168-7E4858E1DF67}"/>
+              </a:ext>
+            </a:extLst>
+          </p:cNvPr>
+          <p:cNvSpPr/>
+          <p:nvPr/>
+        </p:nvSpPr>
+        <p:spPr>
+          <a:xfrm>
+            <a:off x="7645924" y="1489625"/>
+            <a:ext cx="2730043" cy="923330"/>
+          </a:xfrm>
+          <a:prstGeom prst="rect">
+            <a:avLst/>
+          </a:prstGeom>
+          <a:noFill/>
+        </p:spPr>
+        <p:txBody>
+          <a:bodyPr wrap="none" lIns="91440" tIns="45720" rIns="91440" bIns="45720">
+            <a:spAutoFit/>
+            <a:scene3d>
+              <a:camera prst="orthographicFront"/>
+              <a:lightRig rig="soft" dir="t">
+                <a:rot lat="0" lon="0" rev="15600000"/>
+              </a:lightRig>
+            </a:scene3d>
+            <a:sp3d extrusionH="57150" prstMaterial="softEdge">
+              <a:bevelT w="25400" h="38100"/>
+            </a:sp3d>
+          </a:bodyPr>
+          <a:lstStyle/>
+          <a:p>
+            <a:pPr algn="ctr"/>
+            <a:r>
+              <a:rPr lang="en-US" sz="5400" b="1" cap="none" spc="0" dirty="0">
+                <a:ln/>
+                <a:solidFill>
+                  <a:schemeClr val="accent4"/>
+                </a:solidFill>
+                <a:effectLst/>
+              </a:rPr>
+              <a:t>OUTSIDE</a:t>
+            </a:r>
+          </a:p>
+        </p:txBody>
+      </p:sp>
     </p:spTree>
     <p:extLst>
       <p:ext uri="{BB962C8B-B14F-4D97-AF65-F5344CB8AC3E}">
-        <p14:creationId xmlns:p14="http://schemas.microsoft.com/office/powerpoint/2010/main" val="1222996627"/>
+        <p14:creationId xmlns:p14="http://schemas.microsoft.com/office/powerpoint/2010/main" val="1891158571"/>
       </p:ext>
     </p:extLst>
   </p:cSld>
   <p:clrMapOvr>
     <a:masterClrMapping/>
   </p:clrMapOvr>
+  <mc:AlternateContent xmlns:mc="http://schemas.openxmlformats.org/markup-compatibility/2006">
+    <mc:Choice xmlns:p159="http://schemas.microsoft.com/office/powerpoint/2015/09/main" Requires="p159">
+      <p:transition xmlns:p14="http://schemas.microsoft.com/office/powerpoint/2010/main" spd="slow" p14:dur="2000">
+        <p159:morph option="byObject"/>
+      </p:transition>
+    </mc:Choice>
+    <mc:Fallback>
+      <p:transition spd="slow">
+        <p:fade/>
+      </p:transition>
+    </mc:Fallback>
+  </mc:AlternateContent>
 </p:sld>
 </file>
 
@@ -4475,8 +5487,8 @@
         </p:nvSpPr>
         <p:spPr>
           <a:xfrm>
-            <a:off x="0" y="540987"/>
-            <a:ext cx="5616987" cy="923330"/>
+            <a:off x="277586" y="536711"/>
+            <a:ext cx="3185487" cy="923330"/>
           </a:xfrm>
           <a:prstGeom prst="rect">
             <a:avLst/>
@@ -4509,7 +5521,7 @@
                   <a:schemeClr val="accent3"/>
                 </a:solidFill>
               </a:rPr>
-              <a:t>Git hub repository:</a:t>
+              <a:t>3D design:</a:t>
             </a:r>
             <a:endParaRPr lang="en-US" sz="5400" b="1" u="sng" cap="none" spc="0" dirty="0">
               <a:ln/>
@@ -4521,16 +5533,488 @@
           </a:p>
         </p:txBody>
       </p:sp>
+      <p:sp>
+        <p:nvSpPr>
+          <p:cNvPr id="4" name="Rectangle 3">
+            <a:extLst>
+              <a:ext uri="{FF2B5EF4-FFF2-40B4-BE49-F238E27FC236}">
+                <a16:creationId xmlns:a16="http://schemas.microsoft.com/office/drawing/2014/main" id="{94E9AB3A-9C51-4D33-BE3B-F19E2BA3B830}"/>
+              </a:ext>
+            </a:extLst>
+          </p:cNvPr>
+          <p:cNvSpPr/>
+          <p:nvPr/>
+        </p:nvSpPr>
+        <p:spPr>
+          <a:xfrm>
+            <a:off x="7041036" y="2412955"/>
+            <a:ext cx="3939821" cy="4131734"/>
+          </a:xfrm>
+          <a:prstGeom prst="rect">
+            <a:avLst/>
+          </a:prstGeom>
+          <a:noFill/>
+          <a:ln w="38100"/>
+          <a:scene3d>
+            <a:camera prst="orthographicFront"/>
+            <a:lightRig rig="threePt" dir="t"/>
+          </a:scene3d>
+          <a:sp3d>
+            <a:bevelT/>
+          </a:sp3d>
+        </p:spPr>
+        <p:style>
+          <a:lnRef idx="2">
+            <a:schemeClr val="accent1">
+              <a:shade val="50000"/>
+            </a:schemeClr>
+          </a:lnRef>
+          <a:fillRef idx="1">
+            <a:schemeClr val="accent1"/>
+          </a:fillRef>
+          <a:effectRef idx="0">
+            <a:schemeClr val="accent1"/>
+          </a:effectRef>
+          <a:fontRef idx="minor">
+            <a:schemeClr val="lt1"/>
+          </a:fontRef>
+        </p:style>
+        <p:txBody>
+          <a:bodyPr rtlCol="0" anchor="ctr"/>
+          <a:lstStyle/>
+          <a:p>
+            <a:pPr algn="ctr"/>
+            <a:endParaRPr lang="en-GB"/>
+          </a:p>
+        </p:txBody>
+      </p:sp>
+      <mc:AlternateContent xmlns:mc="http://schemas.openxmlformats.org/markup-compatibility/2006">
+        <mc:Choice xmlns:am3d="http://schemas.microsoft.com/office/drawing/2017/model3d" Requires="am3d">
+          <p:graphicFrame>
+            <p:nvGraphicFramePr>
+              <p:cNvPr id="8" name="3D Model 7">
+                <a:extLst>
+                  <a:ext uri="{FF2B5EF4-FFF2-40B4-BE49-F238E27FC236}">
+                    <a16:creationId xmlns:a16="http://schemas.microsoft.com/office/drawing/2014/main" id="{E30EF49C-E632-48B0-B191-F6FF7F79ABCF}"/>
+                  </a:ext>
+                </a:extLst>
+              </p:cNvPr>
+              <p:cNvGraphicFramePr>
+                <a:graphicFrameLocks noChangeAspect="1"/>
+              </p:cNvGraphicFramePr>
+              <p:nvPr>
+                <p:extLst>
+                  <p:ext uri="{D42A27DB-BD31-4B8C-83A1-F6EECF244321}">
+                    <p14:modId xmlns:p14="http://schemas.microsoft.com/office/powerpoint/2010/main" val="1324844636"/>
+                  </p:ext>
+                </p:extLst>
+              </p:nvPr>
+            </p:nvGraphicFramePr>
+            <p:xfrm>
+              <a:off x="1330038" y="2607358"/>
+              <a:ext cx="3081412" cy="3820087"/>
+            </p:xfrm>
+            <a:graphic>
+              <a:graphicData uri="http://schemas.microsoft.com/office/drawing/2017/model3d">
+                <am3d:model3d r:embed="rId2">
+                  <am3d:spPr>
+                    <a:xfrm>
+                      <a:off x="0" y="0"/>
+                      <a:ext cx="3081412" cy="3820087"/>
+                    </a:xfrm>
+                    <a:prstGeom prst="rect">
+                      <a:avLst/>
+                    </a:prstGeom>
+                  </am3d:spPr>
+                  <am3d:camera>
+                    <am3d:pos x="0" y="0" z="72184072"/>
+                    <am3d:up dx="0" dy="36000000" dz="0"/>
+                    <am3d:lookAt x="0" y="0" z="0"/>
+                    <am3d:perspective fov="2700000"/>
+                  </am3d:camera>
+                  <am3d:trans>
+                    <am3d:meterPerModelUnit n="400000" d="1000000"/>
+                    <am3d:preTrans dx="-10691" dy="-3599999" dz="811771"/>
+                    <am3d:scale>
+                      <am3d:sx n="1000000" d="1000000"/>
+                      <am3d:sy n="1000000" d="1000000"/>
+                      <am3d:sz n="1000000" d="1000000"/>
+                    </am3d:scale>
+                    <am3d:rot ax="1200000"/>
+                    <am3d:postTrans dx="0" dy="0" dz="0"/>
+                  </am3d:trans>
+                  <am3d:raster rName="Office3DRenderer" rVer="16.0.8326">
+                    <am3d:blip r:embed="rId3"/>
+                  </am3d:raster>
+                  <am3d:objViewport viewportSz="4582048"/>
+                  <am3d:ambientLight>
+                    <am3d:clr>
+                      <a:scrgbClr r="50000" g="50000" b="50000"/>
+                    </am3d:clr>
+                    <am3d:illuminance n="500000" d="1000000"/>
+                  </am3d:ambientLight>
+                  <am3d:ptLight rad="0">
+                    <am3d:clr>
+                      <a:scrgbClr r="100000" g="75000" b="50000"/>
+                    </am3d:clr>
+                    <am3d:intensity n="9765625" d="1000000"/>
+                    <am3d:pos x="21959998" y="70920001" z="16344003"/>
+                  </am3d:ptLight>
+                  <am3d:ptLight rad="0">
+                    <am3d:clr>
+                      <a:scrgbClr r="40000" g="60000" b="95000"/>
+                    </am3d:clr>
+                    <am3d:intensity n="12250000" d="1000000"/>
+                    <am3d:pos x="-37964106" y="51130435" z="57631972"/>
+                  </am3d:ptLight>
+                  <am3d:ptLight rad="0">
+                    <am3d:clr>
+                      <a:scrgbClr r="86837" g="72700" b="100000"/>
+                    </am3d:clr>
+                    <am3d:intensity n="3125000" d="1000000"/>
+                    <am3d:pos x="-37739122" y="58056624" z="-34769649"/>
+                  </am3d:ptLight>
+                </am3d:model3d>
+              </a:graphicData>
+            </a:graphic>
+          </p:graphicFrame>
+        </mc:Choice>
+        <mc:Fallback>
+          <p:pic>
+            <p:nvPicPr>
+              <p:cNvPr id="8" name="3D Model 7">
+                <a:extLst>
+                  <a:ext uri="{FF2B5EF4-FFF2-40B4-BE49-F238E27FC236}">
+                    <a16:creationId xmlns:a16="http://schemas.microsoft.com/office/drawing/2014/main" id="{E30EF49C-E632-48B0-B191-F6FF7F79ABCF}"/>
+                  </a:ext>
+                </a:extLst>
+              </p:cNvPr>
+              <p:cNvPicPr>
+                <a:picLocks noGrp="1" noRot="1" noChangeAspect="1" noMove="1" noResize="1" noEditPoints="1" noAdjustHandles="1" noChangeArrowheads="1" noChangeShapeType="1" noCrop="1"/>
+              </p:cNvPicPr>
+              <p:nvPr/>
+            </p:nvPicPr>
+            <p:blipFill>
+              <a:blip r:embed="rId3"/>
+              <a:stretch>
+                <a:fillRect/>
+              </a:stretch>
+            </p:blipFill>
+            <p:spPr>
+              <a:xfrm>
+                <a:off x="1330038" y="2607358"/>
+                <a:ext cx="3081412" cy="3820087"/>
+              </a:xfrm>
+              <a:prstGeom prst="rect">
+                <a:avLst/>
+              </a:prstGeom>
+            </p:spPr>
+          </p:pic>
+        </mc:Fallback>
+      </mc:AlternateContent>
+      <mc:AlternateContent xmlns:mc="http://schemas.openxmlformats.org/markup-compatibility/2006">
+        <mc:Choice xmlns:am3d="http://schemas.microsoft.com/office/drawing/2017/model3d" Requires="am3d">
+          <p:graphicFrame>
+            <p:nvGraphicFramePr>
+              <p:cNvPr id="9" name="3D Model 8">
+                <a:extLst>
+                  <a:ext uri="{FF2B5EF4-FFF2-40B4-BE49-F238E27FC236}">
+                    <a16:creationId xmlns:a16="http://schemas.microsoft.com/office/drawing/2014/main" id="{20578DDB-6861-4E31-AB19-E3A041848341}"/>
+                  </a:ext>
+                </a:extLst>
+              </p:cNvPr>
+              <p:cNvGraphicFramePr>
+                <a:graphicFrameLocks noChangeAspect="1"/>
+              </p:cNvGraphicFramePr>
+              <p:nvPr>
+                <p:extLst>
+                  <p:ext uri="{D42A27DB-BD31-4B8C-83A1-F6EECF244321}">
+                    <p14:modId xmlns:p14="http://schemas.microsoft.com/office/powerpoint/2010/main" val="1970371440"/>
+                  </p:ext>
+                </p:extLst>
+              </p:nvPr>
+            </p:nvGraphicFramePr>
+            <p:xfrm>
+              <a:off x="7519487" y="2671489"/>
+              <a:ext cx="2991259" cy="3691825"/>
+            </p:xfrm>
+            <a:graphic>
+              <a:graphicData uri="http://schemas.microsoft.com/office/drawing/2017/model3d">
+                <am3d:model3d r:embed="rId4">
+                  <am3d:spPr>
+                    <a:xfrm>
+                      <a:off x="0" y="0"/>
+                      <a:ext cx="2991259" cy="3691825"/>
+                    </a:xfrm>
+                    <a:prstGeom prst="rect">
+                      <a:avLst/>
+                    </a:prstGeom>
+                  </am3d:spPr>
+                  <am3d:camera>
+                    <am3d:pos x="0" y="0" z="73132759"/>
+                    <am3d:up dx="0" dy="36000000" dz="0"/>
+                    <am3d:lookAt x="0" y="0" z="0"/>
+                    <am3d:perspective fov="2700000"/>
+                  </am3d:camera>
+                  <am3d:trans>
+                    <am3d:meterPerModelUnit n="400000" d="1000000"/>
+                    <am3d:preTrans dx="-118092916" dy="-3600000" dz="162036"/>
+                    <am3d:scale>
+                      <am3d:sx n="1000000" d="1000000"/>
+                      <am3d:sy n="1000000" d="1000000"/>
+                      <am3d:sz n="1000000" d="1000000"/>
+                    </am3d:scale>
+                    <am3d:rot ax="1200000"/>
+                    <am3d:postTrans dx="0" dy="0" dz="0"/>
+                  </am3d:trans>
+                  <am3d:raster rName="Office3DRenderer" rVer="16.0.8326">
+                    <am3d:blip r:embed="rId5"/>
+                  </am3d:raster>
+                  <am3d:objViewport viewportSz="4582050"/>
+                  <am3d:ambientLight>
+                    <am3d:clr>
+                      <a:scrgbClr r="50000" g="50000" b="50000"/>
+                    </am3d:clr>
+                    <am3d:illuminance n="500000" d="1000000"/>
+                  </am3d:ambientLight>
+                  <am3d:ptLight rad="0">
+                    <am3d:clr>
+                      <a:scrgbClr r="100000" g="75000" b="50000"/>
+                    </am3d:clr>
+                    <am3d:intensity n="9765625" d="1000000"/>
+                    <am3d:pos x="21959998" y="70920001" z="16344003"/>
+                  </am3d:ptLight>
+                  <am3d:ptLight rad="0">
+                    <am3d:clr>
+                      <a:scrgbClr r="40000" g="60000" b="95000"/>
+                    </am3d:clr>
+                    <am3d:intensity n="12250000" d="1000000"/>
+                    <am3d:pos x="-37964106" y="51130435" z="57631972"/>
+                  </am3d:ptLight>
+                  <am3d:ptLight rad="0">
+                    <am3d:clr>
+                      <a:scrgbClr r="86837" g="72700" b="100000"/>
+                    </am3d:clr>
+                    <am3d:intensity n="3125000" d="1000000"/>
+                    <am3d:pos x="-37739122" y="58056624" z="-34769649"/>
+                  </am3d:ptLight>
+                </am3d:model3d>
+              </a:graphicData>
+            </a:graphic>
+          </p:graphicFrame>
+        </mc:Choice>
+        <mc:Fallback>
+          <p:pic>
+            <p:nvPicPr>
+              <p:cNvPr id="9" name="3D Model 8">
+                <a:extLst>
+                  <a:ext uri="{FF2B5EF4-FFF2-40B4-BE49-F238E27FC236}">
+                    <a16:creationId xmlns:a16="http://schemas.microsoft.com/office/drawing/2014/main" id="{20578DDB-6861-4E31-AB19-E3A041848341}"/>
+                  </a:ext>
+                </a:extLst>
+              </p:cNvPr>
+              <p:cNvPicPr>
+                <a:picLocks noGrp="1" noRot="1" noChangeAspect="1" noMove="1" noResize="1" noEditPoints="1" noAdjustHandles="1" noChangeArrowheads="1" noChangeShapeType="1" noCrop="1"/>
+              </p:cNvPicPr>
+              <p:nvPr/>
+            </p:nvPicPr>
+            <p:blipFill>
+              <a:blip r:embed="rId5"/>
+              <a:stretch>
+                <a:fillRect/>
+              </a:stretch>
+            </p:blipFill>
+            <p:spPr>
+              <a:xfrm>
+                <a:off x="7519487" y="2671489"/>
+                <a:ext cx="2991259" cy="3691825"/>
+              </a:xfrm>
+              <a:prstGeom prst="rect">
+                <a:avLst/>
+              </a:prstGeom>
+            </p:spPr>
+          </p:pic>
+        </mc:Fallback>
+      </mc:AlternateContent>
+      <p:sp>
+        <p:nvSpPr>
+          <p:cNvPr id="10" name="Rectangle 9">
+            <a:extLst>
+              <a:ext uri="{FF2B5EF4-FFF2-40B4-BE49-F238E27FC236}">
+                <a16:creationId xmlns:a16="http://schemas.microsoft.com/office/drawing/2014/main" id="{F33037CA-8296-497D-AF4C-D5DEC45C9913}"/>
+              </a:ext>
+            </a:extLst>
+          </p:cNvPr>
+          <p:cNvSpPr/>
+          <p:nvPr/>
+        </p:nvSpPr>
+        <p:spPr>
+          <a:xfrm>
+            <a:off x="900835" y="2412955"/>
+            <a:ext cx="3939821" cy="4131734"/>
+          </a:xfrm>
+          <a:prstGeom prst="rect">
+            <a:avLst/>
+          </a:prstGeom>
+          <a:noFill/>
+          <a:ln w="38100"/>
+          <a:scene3d>
+            <a:camera prst="orthographicFront"/>
+            <a:lightRig rig="threePt" dir="t"/>
+          </a:scene3d>
+          <a:sp3d>
+            <a:bevelT/>
+          </a:sp3d>
+        </p:spPr>
+        <p:style>
+          <a:lnRef idx="2">
+            <a:schemeClr val="accent1">
+              <a:shade val="50000"/>
+            </a:schemeClr>
+          </a:lnRef>
+          <a:fillRef idx="1">
+            <a:schemeClr val="accent1"/>
+          </a:fillRef>
+          <a:effectRef idx="0">
+            <a:schemeClr val="accent1"/>
+          </a:effectRef>
+          <a:fontRef idx="minor">
+            <a:schemeClr val="lt1"/>
+          </a:fontRef>
+        </p:style>
+        <p:txBody>
+          <a:bodyPr rtlCol="0" anchor="ctr"/>
+          <a:lstStyle/>
+          <a:p>
+            <a:pPr algn="ctr"/>
+            <a:endParaRPr lang="en-GB"/>
+          </a:p>
+        </p:txBody>
+      </p:sp>
+      <p:sp>
+        <p:nvSpPr>
+          <p:cNvPr id="11" name="Rectangle 10">
+            <a:extLst>
+              <a:ext uri="{FF2B5EF4-FFF2-40B4-BE49-F238E27FC236}">
+                <a16:creationId xmlns:a16="http://schemas.microsoft.com/office/drawing/2014/main" id="{6780CAD0-BF36-41E8-B80C-CF5B59030200}"/>
+              </a:ext>
+            </a:extLst>
+          </p:cNvPr>
+          <p:cNvSpPr/>
+          <p:nvPr/>
+        </p:nvSpPr>
+        <p:spPr>
+          <a:xfrm>
+            <a:off x="1554433" y="1489625"/>
+            <a:ext cx="2111475" cy="923330"/>
+          </a:xfrm>
+          <a:prstGeom prst="rect">
+            <a:avLst/>
+          </a:prstGeom>
+          <a:noFill/>
+        </p:spPr>
+        <p:txBody>
+          <a:bodyPr wrap="none" lIns="91440" tIns="45720" rIns="91440" bIns="45720">
+            <a:spAutoFit/>
+            <a:scene3d>
+              <a:camera prst="orthographicFront"/>
+              <a:lightRig rig="soft" dir="t">
+                <a:rot lat="0" lon="0" rev="15600000"/>
+              </a:lightRig>
+            </a:scene3d>
+            <a:sp3d extrusionH="57150" prstMaterial="softEdge">
+              <a:bevelT w="25400" h="38100"/>
+            </a:sp3d>
+          </a:bodyPr>
+          <a:lstStyle/>
+          <a:p>
+            <a:pPr algn="ctr"/>
+            <a:r>
+              <a:rPr lang="en-US" sz="5400" b="1" cap="none" spc="0" dirty="0">
+                <a:ln/>
+                <a:solidFill>
+                  <a:schemeClr val="accent4"/>
+                </a:solidFill>
+                <a:effectLst/>
+              </a:rPr>
+              <a:t>INSIDE</a:t>
+            </a:r>
+          </a:p>
+        </p:txBody>
+      </p:sp>
+      <p:sp>
+        <p:nvSpPr>
+          <p:cNvPr id="12" name="Rectangle 11">
+            <a:extLst>
+              <a:ext uri="{FF2B5EF4-FFF2-40B4-BE49-F238E27FC236}">
+                <a16:creationId xmlns:a16="http://schemas.microsoft.com/office/drawing/2014/main" id="{79D6FA1F-38F3-48B0-B168-7E4858E1DF67}"/>
+              </a:ext>
+            </a:extLst>
+          </p:cNvPr>
+          <p:cNvSpPr/>
+          <p:nvPr/>
+        </p:nvSpPr>
+        <p:spPr>
+          <a:xfrm>
+            <a:off x="7645924" y="1489625"/>
+            <a:ext cx="2730043" cy="923330"/>
+          </a:xfrm>
+          <a:prstGeom prst="rect">
+            <a:avLst/>
+          </a:prstGeom>
+          <a:noFill/>
+        </p:spPr>
+        <p:txBody>
+          <a:bodyPr wrap="none" lIns="91440" tIns="45720" rIns="91440" bIns="45720">
+            <a:spAutoFit/>
+            <a:scene3d>
+              <a:camera prst="orthographicFront"/>
+              <a:lightRig rig="soft" dir="t">
+                <a:rot lat="0" lon="0" rev="15600000"/>
+              </a:lightRig>
+            </a:scene3d>
+            <a:sp3d extrusionH="57150" prstMaterial="softEdge">
+              <a:bevelT w="25400" h="38100"/>
+            </a:sp3d>
+          </a:bodyPr>
+          <a:lstStyle/>
+          <a:p>
+            <a:pPr algn="ctr"/>
+            <a:r>
+              <a:rPr lang="en-US" sz="5400" b="1" cap="none" spc="0" dirty="0">
+                <a:ln/>
+                <a:solidFill>
+                  <a:schemeClr val="accent4"/>
+                </a:solidFill>
+                <a:effectLst/>
+              </a:rPr>
+              <a:t>OUTSIDE</a:t>
+            </a:r>
+          </a:p>
+        </p:txBody>
+      </p:sp>
     </p:spTree>
     <p:extLst>
       <p:ext uri="{BB962C8B-B14F-4D97-AF65-F5344CB8AC3E}">
-        <p14:creationId xmlns:p14="http://schemas.microsoft.com/office/powerpoint/2010/main" val="531420905"/>
+        <p14:creationId xmlns:p14="http://schemas.microsoft.com/office/powerpoint/2010/main" val="1222996627"/>
       </p:ext>
     </p:extLst>
   </p:cSld>
   <p:clrMapOvr>
     <a:masterClrMapping/>
   </p:clrMapOvr>
+  <mc:AlternateContent xmlns:mc="http://schemas.openxmlformats.org/markup-compatibility/2006">
+    <mc:Choice xmlns:p159="http://schemas.microsoft.com/office/powerpoint/2015/09/main" Requires="p159">
+      <p:transition xmlns:p14="http://schemas.microsoft.com/office/powerpoint/2010/main" spd="slow" p14:dur="2000">
+        <p159:morph option="byObject"/>
+      </p:transition>
+    </mc:Choice>
+    <mc:Fallback>
+      <p:transition spd="slow">
+        <p:fade/>
+      </p:transition>
+    </mc:Fallback>
+  </mc:AlternateContent>
 </p:sld>
 </file>
 

</xml_diff>